<commit_message>
meilleur suivi de la nomenclature
</commit_message>
<xml_diff>
--- a/thématique SI/002 Analyse système/realisation/ppt/si-002-060 cycle de vie.pptx
+++ b/thématique SI/002 Analyse système/realisation/ppt/si-002-060 cycle de vie.pptx
@@ -197,7 +197,7 @@
           <a:p>
             <a:fld id="{EE8BE8BE-B581-423F-8331-D4A09FCC81A6}" type="datetimeFigureOut">
               <a:rPr lang="fr-FR" smtClean="0"/>
-              <a:t>05/06/2023</a:t>
+              <a:t>09/06/2023</a:t>
             </a:fld>
             <a:endParaRPr lang="fr-FR"/>
           </a:p>
@@ -481,6 +481,89 @@
           <a:chExt cx="0" cy="0"/>
         </a:xfrm>
       </p:grpSpPr>
+      <p:sp>
+        <p:nvSpPr>
+          <p:cNvPr id="2" name="Espace réservé des notes 1">
+            <a:extLst>
+              <a:ext uri="{FF2B5EF4-FFF2-40B4-BE49-F238E27FC236}">
+                <a16:creationId xmlns:a16="http://schemas.microsoft.com/office/drawing/2014/main" id="{9777C72C-04B0-CF87-5B72-E272E23FAEC0}"/>
+              </a:ext>
+            </a:extLst>
+          </p:cNvPr>
+          <p:cNvSpPr>
+            <a:spLocks noGrp="1"/>
+          </p:cNvSpPr>
+          <p:nvPr>
+            <p:ph type="body" idx="1"/>
+          </p:nvPr>
+        </p:nvSpPr>
+        <p:spPr/>
+        <p:txBody>
+          <a:bodyPr/>
+          <a:lstStyle/>
+          <a:p>
+            <a:r>
+              <a:rPr lang="fr-FR" dirty="0"/>
+              <a:t>Le système a une vie opérationnelle</a:t>
+            </a:r>
+          </a:p>
+          <a:p>
+            <a:r>
+              <a:rPr lang="fr-FR" dirty="0"/>
+              <a:t>  qui peut être découpé en plusieurs période</a:t>
+            </a:r>
+          </a:p>
+          <a:p>
+            <a:r>
+              <a:rPr lang="fr-FR" dirty="0"/>
+              <a:t>     (lancement, montée en charge,</a:t>
+            </a:r>
+          </a:p>
+          <a:p>
+            <a:r>
+              <a:rPr lang="fr-FR" dirty="0"/>
+              <a:t>           rythme de croisière,</a:t>
+            </a:r>
+          </a:p>
+          <a:p>
+            <a:r>
+              <a:rPr lang="fr-FR" dirty="0"/>
+              <a:t>           sa décroissance,</a:t>
+            </a:r>
+          </a:p>
+          <a:p>
+            <a:r>
+              <a:rPr lang="fr-FR" dirty="0"/>
+              <a:t>           voire on obsolescence et ou recyclage).</a:t>
+            </a:r>
+          </a:p>
+          <a:p>
+            <a:endParaRPr lang="fr-FR"/>
+          </a:p>
+          <a:p>
+            <a:r>
+              <a:rPr lang="fr-FR"/>
+              <a:t>Chacune </a:t>
+            </a:r>
+            <a:r>
+              <a:rPr lang="fr-FR" dirty="0"/>
+              <a:t>de ces période peut être interprétée</a:t>
+            </a:r>
+          </a:p>
+          <a:p>
+            <a:r>
+              <a:rPr lang="fr-FR" dirty="0"/>
+              <a:t> par l'intensité des flux d'entrée-sortie</a:t>
+            </a:r>
+          </a:p>
+          <a:p>
+            <a:r>
+              <a:rPr lang="fr-FR" dirty="0"/>
+              <a:t>   et l'intérêt de la valeur produite.</a:t>
+            </a:r>
+          </a:p>
+        </p:txBody>
+      </p:sp>
     </p:spTree>
   </p:cSld>
   <p:clrMapOvr>
@@ -636,7 +719,7 @@
           <a:p>
             <a:fld id="{558D24C1-D5A3-4B2A-A79F-C3D3495A00EB}" type="datetimeFigureOut">
               <a:rPr lang="fr-FR" smtClean="0"/>
-              <a:t>05/06/2023</a:t>
+              <a:t>09/06/2023</a:t>
             </a:fld>
             <a:endParaRPr lang="fr-FR"/>
           </a:p>
@@ -834,7 +917,7 @@
           <a:p>
             <a:fld id="{558D24C1-D5A3-4B2A-A79F-C3D3495A00EB}" type="datetimeFigureOut">
               <a:rPr lang="fr-FR" smtClean="0"/>
-              <a:t>05/06/2023</a:t>
+              <a:t>09/06/2023</a:t>
             </a:fld>
             <a:endParaRPr lang="fr-FR"/>
           </a:p>
@@ -1042,7 +1125,7 @@
           <a:p>
             <a:fld id="{558D24C1-D5A3-4B2A-A79F-C3D3495A00EB}" type="datetimeFigureOut">
               <a:rPr lang="fr-FR" smtClean="0"/>
-              <a:t>05/06/2023</a:t>
+              <a:t>09/06/2023</a:t>
             </a:fld>
             <a:endParaRPr lang="fr-FR"/>
           </a:p>
@@ -1240,7 +1323,7 @@
           <a:p>
             <a:fld id="{558D24C1-D5A3-4B2A-A79F-C3D3495A00EB}" type="datetimeFigureOut">
               <a:rPr lang="fr-FR" smtClean="0"/>
-              <a:t>05/06/2023</a:t>
+              <a:t>09/06/2023</a:t>
             </a:fld>
             <a:endParaRPr lang="fr-FR"/>
           </a:p>
@@ -1515,7 +1598,7 @@
           <a:p>
             <a:fld id="{558D24C1-D5A3-4B2A-A79F-C3D3495A00EB}" type="datetimeFigureOut">
               <a:rPr lang="fr-FR" smtClean="0"/>
-              <a:t>05/06/2023</a:t>
+              <a:t>09/06/2023</a:t>
             </a:fld>
             <a:endParaRPr lang="fr-FR"/>
           </a:p>
@@ -1780,7 +1863,7 @@
           <a:p>
             <a:fld id="{558D24C1-D5A3-4B2A-A79F-C3D3495A00EB}" type="datetimeFigureOut">
               <a:rPr lang="fr-FR" smtClean="0"/>
-              <a:t>05/06/2023</a:t>
+              <a:t>09/06/2023</a:t>
             </a:fld>
             <a:endParaRPr lang="fr-FR"/>
           </a:p>
@@ -2192,7 +2275,7 @@
           <a:p>
             <a:fld id="{558D24C1-D5A3-4B2A-A79F-C3D3495A00EB}" type="datetimeFigureOut">
               <a:rPr lang="fr-FR" smtClean="0"/>
-              <a:t>05/06/2023</a:t>
+              <a:t>09/06/2023</a:t>
             </a:fld>
             <a:endParaRPr lang="fr-FR"/>
           </a:p>
@@ -2333,7 +2416,7 @@
           <a:p>
             <a:fld id="{558D24C1-D5A3-4B2A-A79F-C3D3495A00EB}" type="datetimeFigureOut">
               <a:rPr lang="fr-FR" smtClean="0"/>
-              <a:t>05/06/2023</a:t>
+              <a:t>09/06/2023</a:t>
             </a:fld>
             <a:endParaRPr lang="fr-FR"/>
           </a:p>
@@ -2446,7 +2529,7 @@
           <a:p>
             <a:fld id="{558D24C1-D5A3-4B2A-A79F-C3D3495A00EB}" type="datetimeFigureOut">
               <a:rPr lang="fr-FR" smtClean="0"/>
-              <a:t>05/06/2023</a:t>
+              <a:t>09/06/2023</a:t>
             </a:fld>
             <a:endParaRPr lang="fr-FR"/>
           </a:p>
@@ -2757,7 +2840,7 @@
           <a:p>
             <a:fld id="{558D24C1-D5A3-4B2A-A79F-C3D3495A00EB}" type="datetimeFigureOut">
               <a:rPr lang="fr-FR" smtClean="0"/>
-              <a:t>05/06/2023</a:t>
+              <a:t>09/06/2023</a:t>
             </a:fld>
             <a:endParaRPr lang="fr-FR"/>
           </a:p>
@@ -3045,7 +3128,7 @@
           <a:p>
             <a:fld id="{558D24C1-D5A3-4B2A-A79F-C3D3495A00EB}" type="datetimeFigureOut">
               <a:rPr lang="fr-FR" smtClean="0"/>
-              <a:t>05/06/2023</a:t>
+              <a:t>09/06/2023</a:t>
             </a:fld>
             <a:endParaRPr lang="fr-FR"/>
           </a:p>
@@ -3286,7 +3369,7 @@
           <a:p>
             <a:fld id="{558D24C1-D5A3-4B2A-A79F-C3D3495A00EB}" type="datetimeFigureOut">
               <a:rPr lang="fr-FR" smtClean="0"/>
-              <a:t>05/06/2023</a:t>
+              <a:t>09/06/2023</a:t>
             </a:fld>
             <a:endParaRPr lang="fr-FR"/>
           </a:p>

</xml_diff>